<commit_message>
Final presentacion fuck yeah
</commit_message>
<xml_diff>
--- a/Desarrollo/SDM/MemoriaABP 16Ene/PresentaciónSDM.pptx
+++ b/Desarrollo/SDM/MemoriaABP 16Ene/PresentaciónSDM.pptx
@@ -5829,25 +5829,245 @@
           </a:p>
         </p:txBody>
       </p:sp>
-      <p:sp>
-        <p:nvSpPr>
-          <p:cNvPr id="3" name="Marcador de contenido 2"/>
-          <p:cNvSpPr>
-            <a:spLocks noGrp="1"/>
-          </p:cNvSpPr>
+      <p:pic>
+        <p:nvPicPr>
+          <p:cNvPr id="4" name="Marcador de contenido 3"/>
+          <p:cNvPicPr>
+            <a:picLocks noGrp="1" noChangeAspect="1"/>
+          </p:cNvPicPr>
           <p:nvPr>
             <p:ph idx="1"/>
           </p:nvPr>
-        </p:nvSpPr>
-        <p:spPr/>
-        <p:txBody>
-          <a:bodyPr/>
-          <a:lstStyle/>
-          <a:p>
-            <a:endParaRPr lang="es-ES"/>
-          </a:p>
-        </p:txBody>
-      </p:sp>
+        </p:nvPicPr>
+        <p:blipFill>
+          <a:blip r:embed="rId2"/>
+          <a:stretch>
+            <a:fillRect/>
+          </a:stretch>
+        </p:blipFill>
+        <p:spPr>
+          <a:xfrm>
+            <a:off x="450166" y="2561458"/>
+            <a:ext cx="1287266" cy="1287266"/>
+          </a:xfrm>
+        </p:spPr>
+      </p:pic>
+      <p:pic>
+        <p:nvPicPr>
+          <p:cNvPr id="5" name="Imagen 4"/>
+          <p:cNvPicPr>
+            <a:picLocks noChangeAspect="1"/>
+          </p:cNvPicPr>
+          <p:nvPr/>
+        </p:nvPicPr>
+        <p:blipFill>
+          <a:blip r:embed="rId3"/>
+          <a:stretch>
+            <a:fillRect/>
+          </a:stretch>
+        </p:blipFill>
+        <p:spPr>
+          <a:xfrm>
+            <a:off x="2365644" y="2561458"/>
+            <a:ext cx="1294302" cy="1294302"/>
+          </a:xfrm>
+          <a:prstGeom prst="rect">
+            <a:avLst/>
+          </a:prstGeom>
+        </p:spPr>
+      </p:pic>
+      <p:pic>
+        <p:nvPicPr>
+          <p:cNvPr id="6" name="Imagen 5"/>
+          <p:cNvPicPr>
+            <a:picLocks noChangeAspect="1"/>
+          </p:cNvPicPr>
+          <p:nvPr/>
+        </p:nvPicPr>
+        <p:blipFill>
+          <a:blip r:embed="rId4"/>
+          <a:stretch>
+            <a:fillRect/>
+          </a:stretch>
+        </p:blipFill>
+        <p:spPr>
+          <a:xfrm>
+            <a:off x="4288158" y="2561458"/>
+            <a:ext cx="1592137" cy="1274979"/>
+          </a:xfrm>
+          <a:prstGeom prst="rect">
+            <a:avLst/>
+          </a:prstGeom>
+        </p:spPr>
+      </p:pic>
+      <p:pic>
+        <p:nvPicPr>
+          <p:cNvPr id="7" name="Imagen 6"/>
+          <p:cNvPicPr>
+            <a:picLocks noChangeAspect="1"/>
+          </p:cNvPicPr>
+          <p:nvPr/>
+        </p:nvPicPr>
+        <p:blipFill>
+          <a:blip r:embed="rId5"/>
+          <a:stretch>
+            <a:fillRect/>
+          </a:stretch>
+        </p:blipFill>
+        <p:spPr>
+          <a:xfrm>
+            <a:off x="6508507" y="2561458"/>
+            <a:ext cx="1256859" cy="1256859"/>
+          </a:xfrm>
+          <a:prstGeom prst="rect">
+            <a:avLst/>
+          </a:prstGeom>
+        </p:spPr>
+      </p:pic>
+      <p:pic>
+        <p:nvPicPr>
+          <p:cNvPr id="8" name="Imagen 7"/>
+          <p:cNvPicPr>
+            <a:picLocks noChangeAspect="1"/>
+          </p:cNvPicPr>
+          <p:nvPr/>
+        </p:nvPicPr>
+        <p:blipFill>
+          <a:blip r:embed="rId6"/>
+          <a:stretch>
+            <a:fillRect/>
+          </a:stretch>
+        </p:blipFill>
+        <p:spPr>
+          <a:xfrm>
+            <a:off x="8393578" y="2561458"/>
+            <a:ext cx="1256859" cy="1256859"/>
+          </a:xfrm>
+          <a:prstGeom prst="rect">
+            <a:avLst/>
+          </a:prstGeom>
+        </p:spPr>
+      </p:pic>
+      <p:pic>
+        <p:nvPicPr>
+          <p:cNvPr id="9" name="Imagen 8"/>
+          <p:cNvPicPr>
+            <a:picLocks noChangeAspect="1"/>
+          </p:cNvPicPr>
+          <p:nvPr/>
+        </p:nvPicPr>
+        <p:blipFill>
+          <a:blip r:embed="rId7"/>
+          <a:stretch>
+            <a:fillRect/>
+          </a:stretch>
+        </p:blipFill>
+        <p:spPr>
+          <a:xfrm>
+            <a:off x="450166" y="4507524"/>
+            <a:ext cx="1287266" cy="1287266"/>
+          </a:xfrm>
+          <a:prstGeom prst="rect">
+            <a:avLst/>
+          </a:prstGeom>
+        </p:spPr>
+      </p:pic>
+      <p:pic>
+        <p:nvPicPr>
+          <p:cNvPr id="10" name="Imagen 9"/>
+          <p:cNvPicPr>
+            <a:picLocks noChangeAspect="1"/>
+          </p:cNvPicPr>
+          <p:nvPr/>
+        </p:nvPicPr>
+        <p:blipFill>
+          <a:blip r:embed="rId8"/>
+          <a:stretch>
+            <a:fillRect/>
+          </a:stretch>
+        </p:blipFill>
+        <p:spPr>
+          <a:xfrm>
+            <a:off x="2365644" y="4471387"/>
+            <a:ext cx="1265211" cy="1265211"/>
+          </a:xfrm>
+          <a:prstGeom prst="rect">
+            <a:avLst/>
+          </a:prstGeom>
+        </p:spPr>
+      </p:pic>
+      <p:pic>
+        <p:nvPicPr>
+          <p:cNvPr id="11" name="Imagen 10"/>
+          <p:cNvPicPr>
+            <a:picLocks noChangeAspect="1"/>
+          </p:cNvPicPr>
+          <p:nvPr/>
+        </p:nvPicPr>
+        <p:blipFill>
+          <a:blip r:embed="rId9"/>
+          <a:stretch>
+            <a:fillRect/>
+          </a:stretch>
+        </p:blipFill>
+        <p:spPr>
+          <a:xfrm>
+            <a:off x="4288158" y="4471387"/>
+            <a:ext cx="1265211" cy="1265211"/>
+          </a:xfrm>
+          <a:prstGeom prst="rect">
+            <a:avLst/>
+          </a:prstGeom>
+        </p:spPr>
+      </p:pic>
+      <p:pic>
+        <p:nvPicPr>
+          <p:cNvPr id="12" name="Imagen 11"/>
+          <p:cNvPicPr>
+            <a:picLocks noChangeAspect="1"/>
+          </p:cNvPicPr>
+          <p:nvPr/>
+        </p:nvPicPr>
+        <p:blipFill>
+          <a:blip r:embed="rId10"/>
+          <a:stretch>
+            <a:fillRect/>
+          </a:stretch>
+        </p:blipFill>
+        <p:spPr>
+          <a:xfrm>
+            <a:off x="6504784" y="4476016"/>
+            <a:ext cx="1260582" cy="1260582"/>
+          </a:xfrm>
+          <a:prstGeom prst="rect">
+            <a:avLst/>
+          </a:prstGeom>
+        </p:spPr>
+      </p:pic>
+      <p:pic>
+        <p:nvPicPr>
+          <p:cNvPr id="13" name="Imagen 12"/>
+          <p:cNvPicPr>
+            <a:picLocks noChangeAspect="1"/>
+          </p:cNvPicPr>
+          <p:nvPr/>
+        </p:nvPicPr>
+        <p:blipFill>
+          <a:blip r:embed="rId11"/>
+          <a:stretch>
+            <a:fillRect/>
+          </a:stretch>
+        </p:blipFill>
+        <p:spPr>
+          <a:xfrm>
+            <a:off x="8393577" y="4468519"/>
+            <a:ext cx="1256859" cy="1268080"/>
+          </a:xfrm>
+          <a:prstGeom prst="rect">
+            <a:avLst/>
+          </a:prstGeom>
+        </p:spPr>
+      </p:pic>
     </p:spTree>
     <p:extLst>
       <p:ext uri="{BB962C8B-B14F-4D97-AF65-F5344CB8AC3E}">

</xml_diff>

<commit_message>
Final presentacion (ahora si)
</commit_message>
<xml_diff>
--- a/Desarrollo/SDM/MemoriaABP 16Ene/PresentaciónSDM.pptx
+++ b/Desarrollo/SDM/MemoriaABP 16Ene/PresentaciónSDM.pptx
@@ -11,6 +11,7 @@
     <p:sldId id="259" r:id="rId5"/>
     <p:sldId id="260" r:id="rId6"/>
     <p:sldId id="261" r:id="rId7"/>
+    <p:sldId id="262" r:id="rId8"/>
   </p:sldIdLst>
   <p:sldSz cx="12192000" cy="6858000"/>
   <p:notesSz cx="6858000" cy="9144000"/>
@@ -212,7 +213,7 @@
           <a:effectLst/>
           <a:extLst>
             <a:ext uri="{91240B29-F687-4f45-9708-019B960494DF}">
-              <a14:hiddenLine xmlns:a14="http://schemas.microsoft.com/office/drawing/2010/main" xmlns="" w="9525">
+              <a14:hiddenLine xmlns="" xmlns:a14="http://schemas.microsoft.com/office/drawing/2010/main" w="9525">
                 <a:solidFill>
                   <a:srgbClr val="000000"/>
                 </a:solidFill>
@@ -1722,7 +1723,7 @@
           <a:ln/>
           <a:extLst>
             <a:ext uri="{91240B29-F687-4f45-9708-019B960494DF}">
-              <a14:hiddenLine xmlns:a14="http://schemas.microsoft.com/office/drawing/2010/main" xmlns="" w="9525">
+              <a14:hiddenLine xmlns="" xmlns:a14="http://schemas.microsoft.com/office/drawing/2010/main" w="9525">
                 <a:solidFill>
                   <a:srgbClr val="000000"/>
                 </a:solidFill>
@@ -1994,7 +1995,7 @@
           <a:ln/>
           <a:extLst>
             <a:ext uri="{91240B29-F687-4f45-9708-019B960494DF}">
-              <a14:hiddenLine xmlns:a14="http://schemas.microsoft.com/office/drawing/2010/main" xmlns="" w="9525">
+              <a14:hiddenLine xmlns="" xmlns:a14="http://schemas.microsoft.com/office/drawing/2010/main" w="9525">
                 <a:solidFill>
                   <a:srgbClr val="000000"/>
                 </a:solidFill>
@@ -2274,7 +2275,7 @@
           <a:ln/>
           <a:extLst>
             <a:ext uri="{91240B29-F687-4f45-9708-019B960494DF}">
-              <a14:hiddenLine xmlns:a14="http://schemas.microsoft.com/office/drawing/2010/main" xmlns="" w="9525">
+              <a14:hiddenLine xmlns="" xmlns:a14="http://schemas.microsoft.com/office/drawing/2010/main" w="9525">
                 <a:solidFill>
                   <a:srgbClr val="000000"/>
                 </a:solidFill>
@@ -2894,7 +2895,7 @@
           <a:ln/>
           <a:extLst>
             <a:ext uri="{91240B29-F687-4f45-9708-019B960494DF}">
-              <a14:hiddenLine xmlns:a14="http://schemas.microsoft.com/office/drawing/2010/main" xmlns="" w="9525">
+              <a14:hiddenLine xmlns="" xmlns:a14="http://schemas.microsoft.com/office/drawing/2010/main" w="9525">
                 <a:solidFill>
                   <a:srgbClr val="000000"/>
                 </a:solidFill>
@@ -3230,7 +3231,7 @@
           <a:ln/>
           <a:extLst>
             <a:ext uri="{91240B29-F687-4f45-9708-019B960494DF}">
-              <a14:hiddenLine xmlns:a14="http://schemas.microsoft.com/office/drawing/2010/main" xmlns="" w="9525">
+              <a14:hiddenLine xmlns="" xmlns:a14="http://schemas.microsoft.com/office/drawing/2010/main" w="9525">
                 <a:solidFill>
                   <a:srgbClr val="000000"/>
                 </a:solidFill>
@@ -3704,7 +3705,7 @@
           <a:ln/>
           <a:extLst>
             <a:ext uri="{91240B29-F687-4f45-9708-019B960494DF}">
-              <a14:hiddenLine xmlns:a14="http://schemas.microsoft.com/office/drawing/2010/main" xmlns="" w="9525">
+              <a14:hiddenLine xmlns="" xmlns:a14="http://schemas.microsoft.com/office/drawing/2010/main" w="9525">
                 <a:solidFill>
                   <a:srgbClr val="000000"/>
                 </a:solidFill>
@@ -4127,7 +4128,7 @@
           <a:ln/>
           <a:extLst>
             <a:ext uri="{91240B29-F687-4f45-9708-019B960494DF}">
-              <a14:hiddenLine xmlns:a14="http://schemas.microsoft.com/office/drawing/2010/main" xmlns="" w="9525">
+              <a14:hiddenLine xmlns="" xmlns:a14="http://schemas.microsoft.com/office/drawing/2010/main" w="9525">
                 <a:solidFill>
                   <a:srgbClr val="000000"/>
                 </a:solidFill>
@@ -5367,7 +5368,7 @@
           <a:p>
             <a:r>
               <a:rPr lang="es-ES" dirty="0"/>
-              <a:t>ALPHASCHOOL</a:t>
+              <a:t>ALPHA SCHOOL</a:t>
             </a:r>
           </a:p>
         </p:txBody>
@@ -5476,7 +5477,7 @@
           <a:p>
             <a:r>
               <a:rPr lang="es-ES" dirty="0"/>
-              <a:t>El proyecto ALPHASCHOOL</a:t>
+              <a:t>El proyecto ALPHA SCHOOL</a:t>
             </a:r>
           </a:p>
         </p:txBody>
@@ -6279,6 +6280,58 @@
 </p:sld>
 </file>
 
+<file path=ppt/slides/slide7.xml><?xml version="1.0" encoding="utf-8"?>
+<p:sld xmlns:a="http://schemas.openxmlformats.org/drawingml/2006/main" xmlns:r="http://schemas.openxmlformats.org/officeDocument/2006/relationships" xmlns:p="http://schemas.openxmlformats.org/presentationml/2006/main">
+  <p:cSld>
+    <p:spTree>
+      <p:nvGrpSpPr>
+        <p:cNvPr id="1" name=""/>
+        <p:cNvGrpSpPr/>
+        <p:nvPr/>
+      </p:nvGrpSpPr>
+      <p:grpSpPr>
+        <a:xfrm>
+          <a:off x="0" y="0"/>
+          <a:ext cx="0" cy="0"/>
+          <a:chOff x="0" y="0"/>
+          <a:chExt cx="0" cy="0"/>
+        </a:xfrm>
+      </p:grpSpPr>
+      <p:sp>
+        <p:nvSpPr>
+          <p:cNvPr id="11" name="Título 10"/>
+          <p:cNvSpPr>
+            <a:spLocks noGrp="1"/>
+          </p:cNvSpPr>
+          <p:nvPr>
+            <p:ph type="title"/>
+          </p:nvPr>
+        </p:nvSpPr>
+        <p:spPr/>
+        <p:txBody>
+          <a:bodyPr/>
+          <a:lstStyle/>
+          <a:p>
+            <a:r>
+              <a:rPr lang="es-ES" dirty="0"/>
+              <a:t>CONCLUSIONES</a:t>
+            </a:r>
+          </a:p>
+        </p:txBody>
+      </p:sp>
+    </p:spTree>
+    <p:extLst>
+      <p:ext uri="{BB962C8B-B14F-4D97-AF65-F5344CB8AC3E}">
+        <p14:creationId xmlns:p14="http://schemas.microsoft.com/office/powerpoint/2010/main" val="3410398186"/>
+      </p:ext>
+    </p:extLst>
+  </p:cSld>
+  <p:clrMapOvr>
+    <a:masterClrMapping/>
+  </p:clrMapOvr>
+</p:sld>
+</file>
+
 <file path=ppt/theme/theme1.xml><?xml version="1.0" encoding="utf-8"?>
 <a:theme xmlns:a="http://schemas.openxmlformats.org/drawingml/2006/main" name="Citable">
   <a:themeElements>

</xml_diff>